<commit_message>
changed California plot color to blue
</commit_message>
<xml_diff>
--- a/Presentation/ProjectOne Presentation_EP.pptx
+++ b/Presentation/ProjectOne Presentation_EP.pptx
@@ -10,8 +10,8 @@
     <p:sldId id="259" r:id="rId4"/>
     <p:sldId id="260" r:id="rId5"/>
     <p:sldId id="261" r:id="rId6"/>
-    <p:sldId id="262" r:id="rId7"/>
-    <p:sldId id="269" r:id="rId8"/>
+    <p:sldId id="269" r:id="rId7"/>
+    <p:sldId id="262" r:id="rId8"/>
     <p:sldId id="270" r:id="rId9"/>
     <p:sldId id="271" r:id="rId10"/>
     <p:sldId id="272" r:id="rId11"/>
@@ -7913,10 +7913,10 @@
       </p:sp>
       <p:pic>
         <p:nvPicPr>
-          <p:cNvPr id="6" name="Content Placeholder 5">
+          <p:cNvPr id="6" name="Content Placeholder 4">
             <a:extLst>
               <a:ext uri="{FF2B5EF4-FFF2-40B4-BE49-F238E27FC236}">
-                <a16:creationId xmlns:a16="http://schemas.microsoft.com/office/drawing/2014/main" id="{0DD8DB08-459B-43DF-A0FF-D168221CA9D9}"/>
+                <a16:creationId xmlns:a16="http://schemas.microsoft.com/office/drawing/2014/main" id="{45C79F27-AAF7-48A9-941B-84B16FBE4AB4}"/>
               </a:ext>
             </a:extLst>
           </p:cNvPr>
@@ -7941,15 +7941,15 @@
         </p:blipFill>
         <p:spPr>
           <a:xfrm>
-            <a:off x="581025" y="2751738"/>
-            <a:ext cx="11029950" cy="2813436"/>
+            <a:off x="180975" y="2638425"/>
+            <a:ext cx="11857654" cy="2841704"/>
           </a:xfrm>
         </p:spPr>
       </p:pic>
     </p:spTree>
     <p:extLst>
       <p:ext uri="{BB962C8B-B14F-4D97-AF65-F5344CB8AC3E}">
-        <p14:creationId xmlns:p14="http://schemas.microsoft.com/office/powerpoint/2010/main" val="2517927290"/>
+        <p14:creationId xmlns:p14="http://schemas.microsoft.com/office/powerpoint/2010/main" val="3828094090"/>
       </p:ext>
     </p:extLst>
   </p:cSld>
@@ -8006,10 +8006,10 @@
       </p:sp>
       <p:sp>
         <p:nvSpPr>
-          <p:cNvPr id="3" name="Content Placeholder 2">
+          <p:cNvPr id="6" name="Content Placeholder 5">
             <a:extLst>
               <a:ext uri="{FF2B5EF4-FFF2-40B4-BE49-F238E27FC236}">
-                <a16:creationId xmlns:a16="http://schemas.microsoft.com/office/drawing/2014/main" id="{F360DE0A-E8ED-4A6D-84CE-7782113F379C}"/>
+                <a16:creationId xmlns:a16="http://schemas.microsoft.com/office/drawing/2014/main" id="{931643CC-9701-4955-AF3E-2638AC990726}"/>
               </a:ext>
             </a:extLst>
           </p:cNvPr>
@@ -8946,17 +8946,17 @@
           <a:p>
             <a:r>
               <a:rPr lang="en-US" dirty="0"/>
-              <a:t>Crash FATALITY RATES VS WINE PRODUCTION</a:t>
+              <a:t>Crash FATALITY RATES VS WINE CONSUMPTION</a:t>
             </a:r>
           </a:p>
         </p:txBody>
       </p:sp>
       <p:pic>
         <p:nvPicPr>
-          <p:cNvPr id="8" name="Content Placeholder 7">
+          <p:cNvPr id="7" name="Content Placeholder 6">
             <a:extLst>
               <a:ext uri="{FF2B5EF4-FFF2-40B4-BE49-F238E27FC236}">
-                <a16:creationId xmlns:a16="http://schemas.microsoft.com/office/drawing/2014/main" id="{262B4E2D-667C-4921-9FA3-F1A10A53C2AA}"/>
+                <a16:creationId xmlns:a16="http://schemas.microsoft.com/office/drawing/2014/main" id="{18C204A8-F519-4D1D-A02F-6862689CAE41}"/>
               </a:ext>
             </a:extLst>
           </p:cNvPr>
@@ -8981,15 +8981,15 @@
         </p:blipFill>
         <p:spPr>
           <a:xfrm>
-            <a:off x="180976" y="1151088"/>
-            <a:ext cx="11830049" cy="5706912"/>
+            <a:off x="96433" y="1114425"/>
+            <a:ext cx="11999135" cy="5743575"/>
           </a:xfrm>
         </p:spPr>
       </p:pic>
     </p:spTree>
     <p:extLst>
       <p:ext uri="{BB962C8B-B14F-4D97-AF65-F5344CB8AC3E}">
-        <p14:creationId xmlns:p14="http://schemas.microsoft.com/office/powerpoint/2010/main" val="711999099"/>
+        <p14:creationId xmlns:p14="http://schemas.microsoft.com/office/powerpoint/2010/main" val="3979656183"/>
       </p:ext>
     </p:extLst>
   </p:cSld>
@@ -9044,17 +9044,17 @@
           <a:p>
             <a:r>
               <a:rPr lang="en-US" dirty="0"/>
-              <a:t>Crash FATALITY RATES VS WINE CONSUMPTION</a:t>
+              <a:t>Crash FATALITY RATES VS WINE PRODUCTION</a:t>
             </a:r>
           </a:p>
         </p:txBody>
       </p:sp>
       <p:pic>
         <p:nvPicPr>
-          <p:cNvPr id="4" name="Content Placeholder 3">
+          <p:cNvPr id="6" name="Content Placeholder 5">
             <a:extLst>
               <a:ext uri="{FF2B5EF4-FFF2-40B4-BE49-F238E27FC236}">
-                <a16:creationId xmlns:a16="http://schemas.microsoft.com/office/drawing/2014/main" id="{2C6918DC-788C-4B67-A17E-6D2F6F4DAF7A}"/>
+                <a16:creationId xmlns:a16="http://schemas.microsoft.com/office/drawing/2014/main" id="{E742FC6A-6CF5-483F-9BBC-DCBA5C58D91A}"/>
               </a:ext>
             </a:extLst>
           </p:cNvPr>
@@ -9079,15 +9079,15 @@
         </p:blipFill>
         <p:spPr>
           <a:xfrm>
-            <a:off x="163410" y="1178545"/>
-            <a:ext cx="11865181" cy="5679455"/>
+            <a:off x="176212" y="1146492"/>
+            <a:ext cx="11839576" cy="5711508"/>
           </a:xfrm>
         </p:spPr>
       </p:pic>
     </p:spTree>
     <p:extLst>
       <p:ext uri="{BB962C8B-B14F-4D97-AF65-F5344CB8AC3E}">
-        <p14:creationId xmlns:p14="http://schemas.microsoft.com/office/powerpoint/2010/main" val="3979656183"/>
+        <p14:creationId xmlns:p14="http://schemas.microsoft.com/office/powerpoint/2010/main" val="711999099"/>
       </p:ext>
     </p:extLst>
   </p:cSld>
@@ -9149,10 +9149,10 @@
       </p:sp>
       <p:pic>
         <p:nvPicPr>
-          <p:cNvPr id="8" name="Content Placeholder 7">
+          <p:cNvPr id="6" name="Content Placeholder 5">
             <a:extLst>
               <a:ext uri="{FF2B5EF4-FFF2-40B4-BE49-F238E27FC236}">
-                <a16:creationId xmlns:a16="http://schemas.microsoft.com/office/drawing/2014/main" id="{7B0D1670-D3D7-48F8-9087-F9F12D365283}"/>
+                <a16:creationId xmlns:a16="http://schemas.microsoft.com/office/drawing/2014/main" id="{23CC9DFE-68E6-4472-AADA-D9A80D14197E}"/>
               </a:ext>
             </a:extLst>
           </p:cNvPr>
@@ -9177,8 +9177,8 @@
         </p:blipFill>
         <p:spPr>
           <a:xfrm>
-            <a:off x="581192" y="1324369"/>
-            <a:ext cx="10505908" cy="5399039"/>
+            <a:off x="166688" y="1199963"/>
+            <a:ext cx="11858624" cy="5658037"/>
           </a:xfrm>
         </p:spPr>
       </p:pic>
@@ -9247,10 +9247,10 @@
       </p:sp>
       <p:pic>
         <p:nvPicPr>
-          <p:cNvPr id="6" name="Content Placeholder 5">
+          <p:cNvPr id="9" name="Content Placeholder 8">
             <a:extLst>
               <a:ext uri="{FF2B5EF4-FFF2-40B4-BE49-F238E27FC236}">
-                <a16:creationId xmlns:a16="http://schemas.microsoft.com/office/drawing/2014/main" id="{337E3920-383F-45A6-A8FA-C7A10A21DBA8}"/>
+                <a16:creationId xmlns:a16="http://schemas.microsoft.com/office/drawing/2014/main" id="{A6DEFBF8-7050-43FC-845F-27C349A608AE}"/>
               </a:ext>
             </a:extLst>
           </p:cNvPr>
@@ -9275,8 +9275,8 @@
         </p:blipFill>
         <p:spPr>
           <a:xfrm>
-            <a:off x="581192" y="1356321"/>
-            <a:ext cx="10753558" cy="5464003"/>
+            <a:off x="161924" y="1209675"/>
+            <a:ext cx="11865357" cy="5648324"/>
           </a:xfrm>
         </p:spPr>
       </p:pic>

</xml_diff>